<commit_message>
Update the database model in the PowerPoint
</commit_message>
<xml_diff>
--- a/CIS560Pres.pptx
+++ b/CIS560Pres.pptx
@@ -108,7 +108,20 @@
       </a:defRPr>
     </a:lvl9pPr>
   </p:defaultTextStyle>
+  <p:extLst>
+    <p:ext uri="{EFAFB233-063F-42B5-8137-9DF3F51BA10A}">
+      <p15:sldGuideLst xmlns:p15="http://schemas.microsoft.com/office/powerpoint/2012/main"/>
+    </p:ext>
+  </p:extLst>
 </p:presentation>
+</file>
+
+<file path=ppt/revisionInfo.xml><?xml version="1.0" encoding="utf-8"?>
+<p1510:revInfo xmlns:a="http://schemas.openxmlformats.org/drawingml/2006/main" xmlns:r="http://schemas.openxmlformats.org/officeDocument/2006/relationships" xmlns:p1510="http://schemas.microsoft.com/office/powerpoint/2015/10/main">
+  <p1510:revLst>
+    <p1510:client id="{EE1F5B0F-278B-484C-A582-F226BC090310}" v="50" dt="2024-04-23T18:54:44.843"/>
+  </p1510:revLst>
+</p1510:revInfo>
 </file>
 
 <file path=ppt/slideLayouts/slideLayout1.xml><?xml version="1.0" encoding="utf-8"?>
@@ -262,7 +275,7 @@
           <a:p>
             <a:fld id="{D208048B-57AF-4F53-BC84-8E0A1033FBEC}" type="datetimeFigureOut">
               <a:rPr lang="en-US" smtClean="0"/>
-              <a:t>4/22/2024</a:t>
+              <a:t>4/23/2024</a:t>
             </a:fld>
             <a:endParaRPr lang="en-US"/>
           </a:p>
@@ -460,7 +473,7 @@
           <a:p>
             <a:fld id="{D208048B-57AF-4F53-BC84-8E0A1033FBEC}" type="datetimeFigureOut">
               <a:rPr lang="en-US" smtClean="0"/>
-              <a:t>4/22/2024</a:t>
+              <a:t>4/23/2024</a:t>
             </a:fld>
             <a:endParaRPr lang="en-US"/>
           </a:p>
@@ -1997,7 +2010,7 @@
           <a:p>
             <a:fld id="{D208048B-57AF-4F53-BC84-8E0A1033FBEC}" type="datetimeFigureOut">
               <a:rPr lang="en-US" smtClean="0"/>
-              <a:t>4/22/2024</a:t>
+              <a:t>4/23/2024</a:t>
             </a:fld>
             <a:endParaRPr lang="en-US"/>
           </a:p>
@@ -2197,7 +2210,7 @@
           <a:p>
             <a:fld id="{D208048B-57AF-4F53-BC84-8E0A1033FBEC}" type="datetimeFigureOut">
               <a:rPr lang="en-US" smtClean="0"/>
-              <a:t>4/22/2024</a:t>
+              <a:t>4/23/2024</a:t>
             </a:fld>
             <a:endParaRPr lang="en-US"/>
           </a:p>
@@ -2475,7 +2488,7 @@
           <a:p>
             <a:fld id="{D208048B-57AF-4F53-BC84-8E0A1033FBEC}" type="datetimeFigureOut">
               <a:rPr lang="en-US" smtClean="0"/>
-              <a:t>4/22/2024</a:t>
+              <a:t>4/23/2024</a:t>
             </a:fld>
             <a:endParaRPr lang="en-US"/>
           </a:p>
@@ -3453,7 +3466,7 @@
           <a:p>
             <a:fld id="{D208048B-57AF-4F53-BC84-8E0A1033FBEC}" type="datetimeFigureOut">
               <a:rPr lang="en-US" smtClean="0"/>
-              <a:t>4/22/2024</a:t>
+              <a:t>4/23/2024</a:t>
             </a:fld>
             <a:endParaRPr lang="en-US"/>
           </a:p>
@@ -4573,7 +4586,7 @@
           <a:p>
             <a:fld id="{D208048B-57AF-4F53-BC84-8E0A1033FBEC}" type="datetimeFigureOut">
               <a:rPr lang="en-US" smtClean="0"/>
-              <a:t>4/22/2024</a:t>
+              <a:t>4/23/2024</a:t>
             </a:fld>
             <a:endParaRPr lang="en-US"/>
           </a:p>
@@ -4720,7 +4733,7 @@
           <a:p>
             <a:fld id="{D208048B-57AF-4F53-BC84-8E0A1033FBEC}" type="datetimeFigureOut">
               <a:rPr lang="en-US" smtClean="0"/>
-              <a:t>4/22/2024</a:t>
+              <a:t>4/23/2024</a:t>
             </a:fld>
             <a:endParaRPr lang="en-US"/>
           </a:p>
@@ -4833,7 +4846,7 @@
           <a:p>
             <a:fld id="{D208048B-57AF-4F53-BC84-8E0A1033FBEC}" type="datetimeFigureOut">
               <a:rPr lang="en-US" smtClean="0"/>
-              <a:t>4/22/2024</a:t>
+              <a:t>4/23/2024</a:t>
             </a:fld>
             <a:endParaRPr lang="en-US"/>
           </a:p>
@@ -6479,7 +6492,7 @@
           <a:p>
             <a:fld id="{D208048B-57AF-4F53-BC84-8E0A1033FBEC}" type="datetimeFigureOut">
               <a:rPr lang="en-US" smtClean="0"/>
-              <a:t>4/22/2024</a:t>
+              <a:t>4/23/2024</a:t>
             </a:fld>
             <a:endParaRPr lang="en-US"/>
           </a:p>
@@ -8117,7 +8130,7 @@
           <a:p>
             <a:fld id="{D208048B-57AF-4F53-BC84-8E0A1033FBEC}" type="datetimeFigureOut">
               <a:rPr lang="en-US" smtClean="0"/>
-              <a:t>4/22/2024</a:t>
+              <a:t>4/23/2024</a:t>
             </a:fld>
             <a:endParaRPr lang="en-US"/>
           </a:p>
@@ -9040,7 +9053,7 @@
             <a:fld id="{D208048B-57AF-4F53-BC84-8E0A1033FBEC}" type="datetimeFigureOut">
               <a:rPr lang="en-US" smtClean="0"/>
               <a:pPr/>
-              <a:t>4/22/2024</a:t>
+              <a:t>4/23/2024</a:t>
             </a:fld>
             <a:endParaRPr lang="en-US" dirty="0"/>
           </a:p>
@@ -11018,6 +11031,14 @@
 <file path=ppt/slides/slide3.xml><?xml version="1.0" encoding="utf-8"?>
 <p:sld xmlns:a="http://schemas.openxmlformats.org/drawingml/2006/main" xmlns:r="http://schemas.openxmlformats.org/officeDocument/2006/relationships" xmlns:p="http://schemas.openxmlformats.org/presentationml/2006/main">
   <p:cSld>
+    <p:bg>
+      <p:bgPr>
+        <a:solidFill>
+          <a:schemeClr val="bg2"/>
+        </a:solidFill>
+        <a:effectLst/>
+      </p:bgPr>
+    </p:bg>
     <p:spTree>
       <p:nvGrpSpPr>
         <p:cNvPr id="1" name=""/>
@@ -11032,6 +11053,1043 @@
           <a:chExt cx="0" cy="0"/>
         </a:xfrm>
       </p:grpSpPr>
+      <p:sp useBgFill="1">
+        <p:nvSpPr>
+          <p:cNvPr id="65" name="Rectangle 64">
+            <a:extLst>
+              <a:ext uri="{FF2B5EF4-FFF2-40B4-BE49-F238E27FC236}">
+                <a16:creationId xmlns:a16="http://schemas.microsoft.com/office/drawing/2014/main" id="{0F358BAA-9C8A-4E17-BAD8-32FD6FFEA730}"/>
+              </a:ext>
+              <a:ext uri="{C183D7F6-B498-43B3-948B-1728B52AA6E4}">
+                <adec:decorative xmlns:adec="http://schemas.microsoft.com/office/drawing/2017/decorative" val="1"/>
+              </a:ext>
+            </a:extLst>
+          </p:cNvPr>
+          <p:cNvSpPr>
+            <a:spLocks noGrp="1" noRot="1" noChangeAspect="1" noMove="1" noResize="1" noEditPoints="1" noAdjustHandles="1" noChangeArrowheads="1" noChangeShapeType="1" noTextEdit="1"/>
+          </p:cNvSpPr>
+          <p:nvPr>
+            <p:extLst>
+              <p:ext uri="{386F3935-93C4-4BCD-93E2-E3B085C9AB24}">
+                <p16:designElem xmlns:p16="http://schemas.microsoft.com/office/powerpoint/2015/main" val="1"/>
+              </p:ext>
+            </p:extLst>
+          </p:nvPr>
+        </p:nvSpPr>
+        <p:spPr>
+          <a:xfrm>
+            <a:off x="0" y="0"/>
+            <a:ext cx="12188952" cy="6858000"/>
+          </a:xfrm>
+          <a:prstGeom prst="rect">
+            <a:avLst/>
+          </a:prstGeom>
+          <a:ln w="9525" cap="flat">
+            <a:noFill/>
+            <a:prstDash val="solid"/>
+            <a:miter/>
+          </a:ln>
+        </p:spPr>
+        <p:txBody>
+          <a:bodyPr rtlCol="0" anchor="ctr"/>
+          <a:lstStyle/>
+          <a:p>
+            <a:endParaRPr lang="en-US">
+              <a:solidFill>
+                <a:schemeClr val="tx1"/>
+              </a:solidFill>
+            </a:endParaRPr>
+          </a:p>
+        </p:txBody>
+      </p:sp>
+      <p:sp>
+        <p:nvSpPr>
+          <p:cNvPr id="67" name="Color Fill">
+            <a:extLst>
+              <a:ext uri="{FF2B5EF4-FFF2-40B4-BE49-F238E27FC236}">
+                <a16:creationId xmlns:a16="http://schemas.microsoft.com/office/drawing/2014/main" id="{4D6F41A4-BEE3-4935-9371-4ADEA67A22F9}"/>
+              </a:ext>
+              <a:ext uri="{C183D7F6-B498-43B3-948B-1728B52AA6E4}">
+                <adec:decorative xmlns:adec="http://schemas.microsoft.com/office/drawing/2017/decorative" val="1"/>
+              </a:ext>
+            </a:extLst>
+          </p:cNvPr>
+          <p:cNvSpPr>
+            <a:spLocks noGrp="1" noRot="1" noChangeAspect="1" noMove="1" noResize="1" noEditPoints="1" noAdjustHandles="1" noChangeArrowheads="1" noChangeShapeType="1" noTextEdit="1"/>
+          </p:cNvSpPr>
+          <p:nvPr>
+            <p:extLst>
+              <p:ext uri="{386F3935-93C4-4BCD-93E2-E3B085C9AB24}">
+                <p16:designElem xmlns:p16="http://schemas.microsoft.com/office/powerpoint/2015/main" val="1"/>
+              </p:ext>
+            </p:extLst>
+          </p:nvPr>
+        </p:nvSpPr>
+        <p:spPr>
+          <a:xfrm>
+            <a:off x="0" y="0"/>
+            <a:ext cx="12188952" cy="6858000"/>
+          </a:xfrm>
+          <a:prstGeom prst="rect">
+            <a:avLst/>
+          </a:prstGeom>
+          <a:solidFill>
+            <a:schemeClr val="bg2">
+              <a:lumMod val="75000"/>
+              <a:lumOff val="25000"/>
+              <a:alpha val="40000"/>
+            </a:schemeClr>
+          </a:solidFill>
+          <a:ln w="9525" cap="flat">
+            <a:noFill/>
+            <a:prstDash val="solid"/>
+            <a:miter/>
+          </a:ln>
+        </p:spPr>
+        <p:txBody>
+          <a:bodyPr rtlCol="0" anchor="ctr"/>
+          <a:lstStyle/>
+          <a:p>
+            <a:endParaRPr lang="en-US" dirty="0">
+              <a:solidFill>
+                <a:schemeClr val="bg2">
+                  <a:lumMod val="75000"/>
+                  <a:lumOff val="25000"/>
+                </a:schemeClr>
+              </a:solidFill>
+            </a:endParaRPr>
+          </a:p>
+        </p:txBody>
+      </p:sp>
+      <p:grpSp>
+        <p:nvGrpSpPr>
+          <p:cNvPr id="69" name="Group 68">
+            <a:extLst>
+              <a:ext uri="{FF2B5EF4-FFF2-40B4-BE49-F238E27FC236}">
+                <a16:creationId xmlns:a16="http://schemas.microsoft.com/office/drawing/2014/main" id="{7726F010-956A-40BC-8A1F-8002DC729B4C}"/>
+              </a:ext>
+              <a:ext uri="{C183D7F6-B498-43B3-948B-1728B52AA6E4}">
+                <adec:decorative xmlns:adec="http://schemas.microsoft.com/office/drawing/2017/decorative" val="1"/>
+              </a:ext>
+            </a:extLst>
+          </p:cNvPr>
+          <p:cNvGrpSpPr>
+            <a:grpSpLocks noGrp="1" noUngrp="1" noRot="1" noChangeAspect="1" noMove="1" noResize="1"/>
+          </p:cNvGrpSpPr>
+          <p:nvPr>
+            <p:extLst>
+              <p:ext uri="{386F3935-93C4-4BCD-93E2-E3B085C9AB24}">
+                <p16:designElem xmlns:p16="http://schemas.microsoft.com/office/powerpoint/2015/main" val="1"/>
+              </p:ext>
+            </p:extLst>
+          </p:nvPr>
+        </p:nvGrpSpPr>
+        <p:grpSpPr>
+          <a:xfrm>
+            <a:off x="8351566" y="0"/>
+            <a:ext cx="3840434" cy="6858000"/>
+            <a:chOff x="8351565" y="0"/>
+            <a:chExt cx="3840434" cy="6858000"/>
+          </a:xfrm>
+        </p:grpSpPr>
+        <p:sp>
+          <p:nvSpPr>
+            <p:cNvPr id="70" name="Oval 69">
+              <a:extLst>
+                <a:ext uri="{FF2B5EF4-FFF2-40B4-BE49-F238E27FC236}">
+                  <a16:creationId xmlns:a16="http://schemas.microsoft.com/office/drawing/2014/main" id="{D386E468-0048-46C4-ADDD-FBE7A6AE9F31}"/>
+                </a:ext>
+                <a:ext uri="{C183D7F6-B498-43B3-948B-1728B52AA6E4}">
+                  <adec:decorative xmlns:adec="http://schemas.microsoft.com/office/drawing/2017/decorative" val="1"/>
+                </a:ext>
+              </a:extLst>
+            </p:cNvPr>
+            <p:cNvSpPr/>
+            <p:nvPr>
+              <p:extLst>
+                <p:ext uri="{386F3935-93C4-4BCD-93E2-E3B085C9AB24}">
+                  <p16:designElem xmlns:p16="http://schemas.microsoft.com/office/powerpoint/2015/main" val="1"/>
+                </p:ext>
+              </p:extLst>
+            </p:nvPr>
+          </p:nvSpPr>
+          <p:spPr>
+            <a:xfrm>
+              <a:off x="11260165" y="519204"/>
+              <a:ext cx="474635" cy="474635"/>
+            </a:xfrm>
+            <a:prstGeom prst="ellipse">
+              <a:avLst/>
+            </a:prstGeom>
+            <a:solidFill>
+              <a:schemeClr val="accent2"/>
+            </a:solidFill>
+            <a:ln>
+              <a:noFill/>
+            </a:ln>
+          </p:spPr>
+          <p:style>
+            <a:lnRef idx="2">
+              <a:schemeClr val="accent1">
+                <a:shade val="50000"/>
+              </a:schemeClr>
+            </a:lnRef>
+            <a:fillRef idx="1">
+              <a:schemeClr val="accent1"/>
+            </a:fillRef>
+            <a:effectRef idx="0">
+              <a:schemeClr val="accent1"/>
+            </a:effectRef>
+            <a:fontRef idx="minor">
+              <a:schemeClr val="lt1"/>
+            </a:fontRef>
+          </p:style>
+          <p:txBody>
+            <a:bodyPr rtlCol="0" anchor="ctr"/>
+            <a:lstStyle/>
+            <a:p>
+              <a:pPr lvl="0" algn="ctr"/>
+              <a:endParaRPr lang="en-US"/>
+            </a:p>
+          </p:txBody>
+        </p:sp>
+        <p:sp>
+          <p:nvSpPr>
+            <p:cNvPr id="71" name="Freeform: Shape 70">
+              <a:extLst>
+                <a:ext uri="{FF2B5EF4-FFF2-40B4-BE49-F238E27FC236}">
+                  <a16:creationId xmlns:a16="http://schemas.microsoft.com/office/drawing/2014/main" id="{C5B35ED4-0C31-4C8C-A45E-6A3EDEAB2867}"/>
+                </a:ext>
+                <a:ext uri="{C183D7F6-B498-43B3-948B-1728B52AA6E4}">
+                  <adec:decorative xmlns:adec="http://schemas.microsoft.com/office/drawing/2017/decorative" val="1"/>
+                </a:ext>
+              </a:extLst>
+            </p:cNvPr>
+            <p:cNvSpPr/>
+            <p:nvPr>
+              <p:extLst>
+                <p:ext uri="{386F3935-93C4-4BCD-93E2-E3B085C9AB24}">
+                  <p16:designElem xmlns:p16="http://schemas.microsoft.com/office/powerpoint/2015/main" val="1"/>
+                </p:ext>
+              </p:extLst>
+            </p:nvPr>
+          </p:nvSpPr>
+          <p:spPr>
+            <a:xfrm>
+              <a:off x="8385871" y="0"/>
+              <a:ext cx="2955657" cy="679194"/>
+            </a:xfrm>
+            <a:custGeom>
+              <a:avLst/>
+              <a:gdLst>
+                <a:gd name="connsiteX0" fmla="*/ 0 w 2955657"/>
+                <a:gd name="connsiteY0" fmla="*/ 0 h 679194"/>
+                <a:gd name="connsiteX1" fmla="*/ 2955657 w 2955657"/>
+                <a:gd name="connsiteY1" fmla="*/ 0 h 679194"/>
+                <a:gd name="connsiteX2" fmla="*/ 2892839 w 2955657"/>
+                <a:gd name="connsiteY2" fmla="*/ 84007 h 679194"/>
+                <a:gd name="connsiteX3" fmla="*/ 1630760 w 2955657"/>
+                <a:gd name="connsiteY3" fmla="*/ 679194 h 679194"/>
+                <a:gd name="connsiteX4" fmla="*/ 0 w 2955657"/>
+                <a:gd name="connsiteY4" fmla="*/ 679194 h 679194"/>
+              </a:gdLst>
+              <a:ahLst/>
+              <a:cxnLst>
+                <a:cxn ang="0">
+                  <a:pos x="connsiteX0" y="connsiteY0"/>
+                </a:cxn>
+                <a:cxn ang="0">
+                  <a:pos x="connsiteX1" y="connsiteY1"/>
+                </a:cxn>
+                <a:cxn ang="0">
+                  <a:pos x="connsiteX2" y="connsiteY2"/>
+                </a:cxn>
+                <a:cxn ang="0">
+                  <a:pos x="connsiteX3" y="connsiteY3"/>
+                </a:cxn>
+                <a:cxn ang="0">
+                  <a:pos x="connsiteX4" y="connsiteY4"/>
+                </a:cxn>
+              </a:cxnLst>
+              <a:rect l="l" t="t" r="r" b="b"/>
+              <a:pathLst>
+                <a:path w="2955657" h="679194">
+                  <a:moveTo>
+                    <a:pt x="0" y="0"/>
+                  </a:moveTo>
+                  <a:lnTo>
+                    <a:pt x="2955657" y="0"/>
+                  </a:lnTo>
+                  <a:lnTo>
+                    <a:pt x="2892839" y="84007"/>
+                  </a:lnTo>
+                  <a:cubicBezTo>
+                    <a:pt x="2592855" y="447504"/>
+                    <a:pt x="2138868" y="679194"/>
+                    <a:pt x="1630760" y="679194"/>
+                  </a:cubicBezTo>
+                  <a:lnTo>
+                    <a:pt x="0" y="679194"/>
+                  </a:lnTo>
+                  <a:close/>
+                </a:path>
+              </a:pathLst>
+            </a:custGeom>
+            <a:solidFill>
+              <a:schemeClr val="accent1">
+                <a:lumMod val="60000"/>
+                <a:lumOff val="40000"/>
+                <a:alpha val="60000"/>
+              </a:schemeClr>
+            </a:solidFill>
+            <a:ln w="9331" cap="flat">
+              <a:noFill/>
+              <a:prstDash val="solid"/>
+              <a:miter/>
+            </a:ln>
+          </p:spPr>
+          <p:txBody>
+            <a:bodyPr rtlCol="0" anchor="ctr"/>
+            <a:lstStyle/>
+            <a:p>
+              <a:pPr lvl="0"/>
+              <a:endParaRPr lang="en-US"/>
+            </a:p>
+          </p:txBody>
+        </p:sp>
+        <p:sp>
+          <p:nvSpPr>
+            <p:cNvPr id="72" name="Freeform: Shape 71">
+              <a:extLst>
+                <a:ext uri="{FF2B5EF4-FFF2-40B4-BE49-F238E27FC236}">
+                  <a16:creationId xmlns:a16="http://schemas.microsoft.com/office/drawing/2014/main" id="{B40A1EF3-FA93-48F4-9F82-BC0C79635750}"/>
+                </a:ext>
+                <a:ext uri="{C183D7F6-B498-43B3-948B-1728B52AA6E4}">
+                  <adec:decorative xmlns:adec="http://schemas.microsoft.com/office/drawing/2017/decorative" val="1"/>
+                </a:ext>
+              </a:extLst>
+            </p:cNvPr>
+            <p:cNvSpPr/>
+            <p:nvPr>
+              <p:extLst>
+                <p:ext uri="{386F3935-93C4-4BCD-93E2-E3B085C9AB24}">
+                  <p16:designElem xmlns:p16="http://schemas.microsoft.com/office/powerpoint/2015/main" val="1"/>
+                </p:ext>
+              </p:extLst>
+            </p:nvPr>
+          </p:nvSpPr>
+          <p:spPr>
+            <a:xfrm>
+              <a:off x="8351565" y="4121414"/>
+              <a:ext cx="3266317" cy="2736586"/>
+            </a:xfrm>
+            <a:custGeom>
+              <a:avLst/>
+              <a:gdLst>
+                <a:gd name="connsiteX0" fmla="*/ 1635557 w 3266317"/>
+                <a:gd name="connsiteY0" fmla="*/ 0 h 2736586"/>
+                <a:gd name="connsiteX1" fmla="*/ 3266317 w 3266317"/>
+                <a:gd name="connsiteY1" fmla="*/ 0 h 2736586"/>
+                <a:gd name="connsiteX2" fmla="*/ 3266317 w 3266317"/>
+                <a:gd name="connsiteY2" fmla="*/ 1630760 h 2736586"/>
+                <a:gd name="connsiteX3" fmla="*/ 2892838 w 3266317"/>
+                <a:gd name="connsiteY3" fmla="*/ 2671131 h 2736586"/>
+                <a:gd name="connsiteX4" fmla="*/ 2833348 w 3266317"/>
+                <a:gd name="connsiteY4" fmla="*/ 2736586 h 2736586"/>
+                <a:gd name="connsiteX5" fmla="*/ 0 w 3266317"/>
+                <a:gd name="connsiteY5" fmla="*/ 2736586 h 2736586"/>
+                <a:gd name="connsiteX6" fmla="*/ 0 w 3266317"/>
+                <a:gd name="connsiteY6" fmla="*/ 1635558 h 2736586"/>
+                <a:gd name="connsiteX7" fmla="*/ 1635557 w 3266317"/>
+                <a:gd name="connsiteY7" fmla="*/ 0 h 2736586"/>
+              </a:gdLst>
+              <a:ahLst/>
+              <a:cxnLst>
+                <a:cxn ang="0">
+                  <a:pos x="connsiteX0" y="connsiteY0"/>
+                </a:cxn>
+                <a:cxn ang="0">
+                  <a:pos x="connsiteX1" y="connsiteY1"/>
+                </a:cxn>
+                <a:cxn ang="0">
+                  <a:pos x="connsiteX2" y="connsiteY2"/>
+                </a:cxn>
+                <a:cxn ang="0">
+                  <a:pos x="connsiteX3" y="connsiteY3"/>
+                </a:cxn>
+                <a:cxn ang="0">
+                  <a:pos x="connsiteX4" y="connsiteY4"/>
+                </a:cxn>
+                <a:cxn ang="0">
+                  <a:pos x="connsiteX5" y="connsiteY5"/>
+                </a:cxn>
+                <a:cxn ang="0">
+                  <a:pos x="connsiteX6" y="connsiteY6"/>
+                </a:cxn>
+                <a:cxn ang="0">
+                  <a:pos x="connsiteX7" y="connsiteY7"/>
+                </a:cxn>
+              </a:cxnLst>
+              <a:rect l="l" t="t" r="r" b="b"/>
+              <a:pathLst>
+                <a:path w="3266317" h="2736586">
+                  <a:moveTo>
+                    <a:pt x="1635557" y="0"/>
+                  </a:moveTo>
+                  <a:lnTo>
+                    <a:pt x="3266317" y="0"/>
+                  </a:lnTo>
+                  <a:lnTo>
+                    <a:pt x="3266317" y="1630760"/>
+                  </a:lnTo>
+                  <a:cubicBezTo>
+                    <a:pt x="3266317" y="2025955"/>
+                    <a:pt x="3126159" y="2388411"/>
+                    <a:pt x="2892838" y="2671131"/>
+                  </a:cubicBezTo>
+                  <a:lnTo>
+                    <a:pt x="2833348" y="2736586"/>
+                  </a:lnTo>
+                  <a:lnTo>
+                    <a:pt x="0" y="2736586"/>
+                  </a:lnTo>
+                  <a:lnTo>
+                    <a:pt x="0" y="1635558"/>
+                  </a:lnTo>
+                  <a:cubicBezTo>
+                    <a:pt x="0" y="732255"/>
+                    <a:pt x="732254" y="0"/>
+                    <a:pt x="1635557" y="0"/>
+                  </a:cubicBezTo>
+                  <a:close/>
+                </a:path>
+              </a:pathLst>
+            </a:custGeom>
+            <a:solidFill>
+              <a:schemeClr val="accent1">
+                <a:lumMod val="60000"/>
+                <a:lumOff val="40000"/>
+                <a:alpha val="60000"/>
+              </a:schemeClr>
+            </a:solidFill>
+            <a:ln w="9331" cap="flat">
+              <a:noFill/>
+              <a:prstDash val="solid"/>
+              <a:miter/>
+            </a:ln>
+          </p:spPr>
+          <p:txBody>
+            <a:bodyPr rtlCol="0" anchor="ctr"/>
+            <a:lstStyle/>
+            <a:p>
+              <a:pPr lvl="0"/>
+              <a:endParaRPr lang="en-US" dirty="0"/>
+            </a:p>
+          </p:txBody>
+        </p:sp>
+        <p:sp>
+          <p:nvSpPr>
+            <p:cNvPr id="73" name="Freeform: Shape 72">
+              <a:extLst>
+                <a:ext uri="{FF2B5EF4-FFF2-40B4-BE49-F238E27FC236}">
+                  <a16:creationId xmlns:a16="http://schemas.microsoft.com/office/drawing/2014/main" id="{A985F09D-6969-44D0-B04F-4EDE0FEDAF63}"/>
+                </a:ext>
+                <a:ext uri="{C183D7F6-B498-43B3-948B-1728B52AA6E4}">
+                  <adec:decorative xmlns:adec="http://schemas.microsoft.com/office/drawing/2017/decorative" val="1"/>
+                </a:ext>
+              </a:extLst>
+            </p:cNvPr>
+            <p:cNvSpPr/>
+            <p:nvPr>
+              <p:extLst>
+                <p:ext uri="{386F3935-93C4-4BCD-93E2-E3B085C9AB24}">
+                  <p16:designElem xmlns:p16="http://schemas.microsoft.com/office/powerpoint/2015/main" val="1"/>
+                </p:ext>
+              </p:extLst>
+            </p:nvPr>
+          </p:nvSpPr>
+          <p:spPr>
+            <a:xfrm>
+              <a:off x="11755674" y="3386384"/>
+              <a:ext cx="436325" cy="1309674"/>
+            </a:xfrm>
+            <a:custGeom>
+              <a:avLst/>
+              <a:gdLst>
+                <a:gd name="connsiteX0" fmla="*/ 470325 w 477612"/>
+                <a:gd name="connsiteY0" fmla="*/ 0 h 1433600"/>
+                <a:gd name="connsiteX1" fmla="*/ 475607 w 477612"/>
+                <a:gd name="connsiteY1" fmla="*/ 3701 h 1433600"/>
+                <a:gd name="connsiteX2" fmla="*/ 477612 w 477612"/>
+                <a:gd name="connsiteY2" fmla="*/ 5160 h 1433600"/>
+                <a:gd name="connsiteX3" fmla="*/ 477612 w 477612"/>
+                <a:gd name="connsiteY3" fmla="*/ 1428441 h 1433600"/>
+                <a:gd name="connsiteX4" fmla="*/ 475607 w 477612"/>
+                <a:gd name="connsiteY4" fmla="*/ 1429900 h 1433600"/>
+                <a:gd name="connsiteX5" fmla="*/ 470325 w 477612"/>
+                <a:gd name="connsiteY5" fmla="*/ 1433600 h 1433600"/>
+                <a:gd name="connsiteX6" fmla="*/ 0 w 477612"/>
+                <a:gd name="connsiteY6" fmla="*/ 716800 h 1433600"/>
+                <a:gd name="connsiteX7" fmla="*/ 470325 w 477612"/>
+                <a:gd name="connsiteY7" fmla="*/ 0 h 1433600"/>
+              </a:gdLst>
+              <a:ahLst/>
+              <a:cxnLst>
+                <a:cxn ang="0">
+                  <a:pos x="connsiteX0" y="connsiteY0"/>
+                </a:cxn>
+                <a:cxn ang="0">
+                  <a:pos x="connsiteX1" y="connsiteY1"/>
+                </a:cxn>
+                <a:cxn ang="0">
+                  <a:pos x="connsiteX2" y="connsiteY2"/>
+                </a:cxn>
+                <a:cxn ang="0">
+                  <a:pos x="connsiteX3" y="connsiteY3"/>
+                </a:cxn>
+                <a:cxn ang="0">
+                  <a:pos x="connsiteX4" y="connsiteY4"/>
+                </a:cxn>
+                <a:cxn ang="0">
+                  <a:pos x="connsiteX5" y="connsiteY5"/>
+                </a:cxn>
+                <a:cxn ang="0">
+                  <a:pos x="connsiteX6" y="connsiteY6"/>
+                </a:cxn>
+                <a:cxn ang="0">
+                  <a:pos x="connsiteX7" y="connsiteY7"/>
+                </a:cxn>
+              </a:cxnLst>
+              <a:rect l="l" t="t" r="r" b="b"/>
+              <a:pathLst>
+                <a:path w="477612" h="1433600">
+                  <a:moveTo>
+                    <a:pt x="470325" y="0"/>
+                  </a:moveTo>
+                  <a:cubicBezTo>
+                    <a:pt x="470325" y="0"/>
+                    <a:pt x="472162" y="1254"/>
+                    <a:pt x="475607" y="3701"/>
+                  </a:cubicBezTo>
+                  <a:lnTo>
+                    <a:pt x="477612" y="5160"/>
+                  </a:lnTo>
+                  <a:lnTo>
+                    <a:pt x="477612" y="1428441"/>
+                  </a:lnTo>
+                  <a:lnTo>
+                    <a:pt x="475607" y="1429900"/>
+                  </a:lnTo>
+                  <a:cubicBezTo>
+                    <a:pt x="472162" y="1432347"/>
+                    <a:pt x="470325" y="1433600"/>
+                    <a:pt x="470325" y="1433600"/>
+                  </a:cubicBezTo>
+                  <a:cubicBezTo>
+                    <a:pt x="470325" y="1433600"/>
+                    <a:pt x="0" y="1112672"/>
+                    <a:pt x="0" y="716800"/>
+                  </a:cubicBezTo>
+                  <a:cubicBezTo>
+                    <a:pt x="0" y="320929"/>
+                    <a:pt x="470325" y="0"/>
+                    <a:pt x="470325" y="0"/>
+                  </a:cubicBezTo>
+                  <a:close/>
+                </a:path>
+              </a:pathLst>
+            </a:custGeom>
+            <a:pattFill prst="pct5">
+              <a:fgClr>
+                <a:schemeClr val="accent4">
+                  <a:lumMod val="20000"/>
+                  <a:lumOff val="80000"/>
+                </a:schemeClr>
+              </a:fgClr>
+              <a:bgClr>
+                <a:schemeClr val="accent4">
+                  <a:lumMod val="60000"/>
+                  <a:lumOff val="40000"/>
+                </a:schemeClr>
+              </a:bgClr>
+            </a:pattFill>
+            <a:ln w="9525" cap="flat">
+              <a:noFill/>
+              <a:prstDash val="solid"/>
+              <a:miter/>
+            </a:ln>
+          </p:spPr>
+          <p:txBody>
+            <a:bodyPr rtlCol="0" anchor="ctr"/>
+            <a:lstStyle/>
+            <a:p>
+              <a:pPr lvl="0"/>
+              <a:endParaRPr lang="en-US" dirty="0"/>
+            </a:p>
+          </p:txBody>
+        </p:sp>
+        <p:sp>
+          <p:nvSpPr>
+            <p:cNvPr id="74" name="Graphic 9">
+              <a:extLst>
+                <a:ext uri="{FF2B5EF4-FFF2-40B4-BE49-F238E27FC236}">
+                  <a16:creationId xmlns:a16="http://schemas.microsoft.com/office/drawing/2014/main" id="{003913A0-A3C0-4ED8-8920-318068FBC46F}"/>
+                </a:ext>
+                <a:ext uri="{C183D7F6-B498-43B3-948B-1728B52AA6E4}">
+                  <adec:decorative xmlns:adec="http://schemas.microsoft.com/office/drawing/2017/decorative" val="1"/>
+                </a:ext>
+              </a:extLst>
+            </p:cNvPr>
+            <p:cNvSpPr/>
+            <p:nvPr>
+              <p:extLst>
+                <p:ext uri="{386F3935-93C4-4BCD-93E2-E3B085C9AB24}">
+                  <p16:designElem xmlns:p16="http://schemas.microsoft.com/office/powerpoint/2015/main" val="1"/>
+                </p:ext>
+              </p:extLst>
+            </p:nvPr>
+          </p:nvSpPr>
+          <p:spPr>
+            <a:xfrm>
+              <a:off x="8385870" y="791588"/>
+              <a:ext cx="3232012" cy="3232012"/>
+            </a:xfrm>
+            <a:custGeom>
+              <a:avLst/>
+              <a:gdLst>
+                <a:gd name="connsiteX0" fmla="*/ 6861546 w 6861545"/>
+                <a:gd name="connsiteY0" fmla="*/ 6861546 h 6861545"/>
+                <a:gd name="connsiteX1" fmla="*/ 3435812 w 6861545"/>
+                <a:gd name="connsiteY1" fmla="*/ 6861546 h 6861545"/>
+                <a:gd name="connsiteX2" fmla="*/ 0 w 6861545"/>
+                <a:gd name="connsiteY2" fmla="*/ 3425734 h 6861545"/>
+                <a:gd name="connsiteX3" fmla="*/ 0 w 6861545"/>
+                <a:gd name="connsiteY3" fmla="*/ 0 h 6861545"/>
+                <a:gd name="connsiteX4" fmla="*/ 3425734 w 6861545"/>
+                <a:gd name="connsiteY4" fmla="*/ 0 h 6861545"/>
+                <a:gd name="connsiteX5" fmla="*/ 6861546 w 6861545"/>
+                <a:gd name="connsiteY5" fmla="*/ 3435812 h 6861545"/>
+                <a:gd name="connsiteX6" fmla="*/ 6861546 w 6861545"/>
+                <a:gd name="connsiteY6" fmla="*/ 6861546 h 6861545"/>
+              </a:gdLst>
+              <a:ahLst/>
+              <a:cxnLst>
+                <a:cxn ang="0">
+                  <a:pos x="connsiteX0" y="connsiteY0"/>
+                </a:cxn>
+                <a:cxn ang="0">
+                  <a:pos x="connsiteX1" y="connsiteY1"/>
+                </a:cxn>
+                <a:cxn ang="0">
+                  <a:pos x="connsiteX2" y="connsiteY2"/>
+                </a:cxn>
+                <a:cxn ang="0">
+                  <a:pos x="connsiteX3" y="connsiteY3"/>
+                </a:cxn>
+                <a:cxn ang="0">
+                  <a:pos x="connsiteX4" y="connsiteY4"/>
+                </a:cxn>
+                <a:cxn ang="0">
+                  <a:pos x="connsiteX5" y="connsiteY5"/>
+                </a:cxn>
+                <a:cxn ang="0">
+                  <a:pos x="connsiteX6" y="connsiteY6"/>
+                </a:cxn>
+              </a:cxnLst>
+              <a:rect l="l" t="t" r="r" b="b"/>
+              <a:pathLst>
+                <a:path w="6861545" h="6861545">
+                  <a:moveTo>
+                    <a:pt x="6861546" y="6861546"/>
+                  </a:moveTo>
+                  <a:lnTo>
+                    <a:pt x="3435812" y="6861546"/>
+                  </a:lnTo>
+                  <a:cubicBezTo>
+                    <a:pt x="1538245" y="6861546"/>
+                    <a:pt x="0" y="5323301"/>
+                    <a:pt x="0" y="3425734"/>
+                  </a:cubicBezTo>
+                  <a:lnTo>
+                    <a:pt x="0" y="0"/>
+                  </a:lnTo>
+                  <a:lnTo>
+                    <a:pt x="3425734" y="0"/>
+                  </a:lnTo>
+                  <a:cubicBezTo>
+                    <a:pt x="5323301" y="0"/>
+                    <a:pt x="6861546" y="1538245"/>
+                    <a:pt x="6861546" y="3435812"/>
+                  </a:cubicBezTo>
+                  <a:lnTo>
+                    <a:pt x="6861546" y="6861546"/>
+                  </a:lnTo>
+                  <a:close/>
+                </a:path>
+              </a:pathLst>
+            </a:custGeom>
+            <a:pattFill prst="pct5">
+              <a:fgClr>
+                <a:schemeClr val="accent4">
+                  <a:lumMod val="60000"/>
+                  <a:lumOff val="40000"/>
+                </a:schemeClr>
+              </a:fgClr>
+              <a:bgClr>
+                <a:schemeClr val="accent1">
+                  <a:lumMod val="75000"/>
+                </a:schemeClr>
+              </a:bgClr>
+            </a:pattFill>
+            <a:ln w="9525" cap="flat">
+              <a:noFill/>
+              <a:prstDash val="solid"/>
+              <a:miter/>
+            </a:ln>
+          </p:spPr>
+          <p:txBody>
+            <a:bodyPr rtlCol="0" anchor="ctr"/>
+            <a:lstStyle/>
+            <a:p>
+              <a:pPr lvl="0"/>
+              <a:endParaRPr lang="en-US"/>
+            </a:p>
+          </p:txBody>
+        </p:sp>
+      </p:grpSp>
+      <p:sp>
+        <p:nvSpPr>
+          <p:cNvPr id="76" name="Texture">
+            <a:extLst>
+              <a:ext uri="{FF2B5EF4-FFF2-40B4-BE49-F238E27FC236}">
+                <a16:creationId xmlns:a16="http://schemas.microsoft.com/office/drawing/2014/main" id="{7FE1D329-7CB2-4DF5-B0C0-36DD19EBC66D}"/>
+              </a:ext>
+              <a:ext uri="{C183D7F6-B498-43B3-948B-1728B52AA6E4}">
+                <adec:decorative xmlns:adec="http://schemas.microsoft.com/office/drawing/2017/decorative" val="1"/>
+              </a:ext>
+            </a:extLst>
+          </p:cNvPr>
+          <p:cNvSpPr>
+            <a:spLocks noGrp="1" noRot="1" noChangeAspect="1" noMove="1" noResize="1" noEditPoints="1" noAdjustHandles="1" noChangeArrowheads="1" noChangeShapeType="1" noTextEdit="1"/>
+          </p:cNvSpPr>
+          <p:nvPr>
+            <p:extLst>
+              <p:ext uri="{386F3935-93C4-4BCD-93E2-E3B085C9AB24}">
+                <p16:designElem xmlns:p16="http://schemas.microsoft.com/office/powerpoint/2015/main" val="1"/>
+              </p:ext>
+            </p:extLst>
+          </p:nvPr>
+        </p:nvSpPr>
+        <p:spPr>
+          <a:xfrm>
+            <a:off x="3048" y="0"/>
+            <a:ext cx="12188952" cy="6858000"/>
+          </a:xfrm>
+          <a:prstGeom prst="rect">
+            <a:avLst/>
+          </a:prstGeom>
+          <a:blipFill dpi="0" rotWithShape="1">
+            <a:blip r:embed="rId2">
+              <a:alphaModFix amt="6000"/>
+            </a:blip>
+            <a:srcRect/>
+            <a:tile tx="0" ty="0" sx="100000" sy="100000" flip="none" algn="tl"/>
+          </a:blipFill>
+          <a:ln w="9525" cap="flat">
+            <a:noFill/>
+            <a:prstDash val="solid"/>
+            <a:miter/>
+          </a:ln>
+        </p:spPr>
+        <p:txBody>
+          <a:bodyPr rtlCol="0" anchor="ctr"/>
+          <a:lstStyle/>
+          <a:p>
+            <a:endParaRPr lang="en-US" dirty="0"/>
+          </a:p>
+        </p:txBody>
+      </p:sp>
+      <p:sp useBgFill="1">
+        <p:nvSpPr>
+          <p:cNvPr id="78" name="Background Fill">
+            <a:extLst>
+              <a:ext uri="{FF2B5EF4-FFF2-40B4-BE49-F238E27FC236}">
+                <a16:creationId xmlns:a16="http://schemas.microsoft.com/office/drawing/2014/main" id="{A7971386-B2B0-4A38-8D3B-8CF23AAA610C}"/>
+              </a:ext>
+              <a:ext uri="{C183D7F6-B498-43B3-948B-1728B52AA6E4}">
+                <adec:decorative xmlns:adec="http://schemas.microsoft.com/office/drawing/2017/decorative" val="1"/>
+              </a:ext>
+            </a:extLst>
+          </p:cNvPr>
+          <p:cNvSpPr>
+            <a:spLocks noGrp="1" noRot="1" noChangeAspect="1" noMove="1" noResize="1" noEditPoints="1" noAdjustHandles="1" noChangeArrowheads="1" noChangeShapeType="1" noTextEdit="1"/>
+          </p:cNvSpPr>
+          <p:nvPr>
+            <p:extLst>
+              <p:ext uri="{386F3935-93C4-4BCD-93E2-E3B085C9AB24}">
+                <p16:designElem xmlns:p16="http://schemas.microsoft.com/office/powerpoint/2015/main" val="1"/>
+              </p:ext>
+            </p:extLst>
+          </p:nvPr>
+        </p:nvSpPr>
+        <p:spPr>
+          <a:xfrm>
+            <a:off x="0" y="0"/>
+            <a:ext cx="12192000" cy="6858000"/>
+          </a:xfrm>
+          <a:prstGeom prst="rect">
+            <a:avLst/>
+          </a:prstGeom>
+          <a:ln w="9525" cap="flat">
+            <a:noFill/>
+            <a:prstDash val="solid"/>
+            <a:miter/>
+          </a:ln>
+        </p:spPr>
+        <p:txBody>
+          <a:bodyPr rtlCol="0" anchor="ctr"/>
+          <a:lstStyle/>
+          <a:p>
+            <a:endParaRPr lang="en-US">
+              <a:solidFill>
+                <a:schemeClr val="tx1"/>
+              </a:solidFill>
+            </a:endParaRPr>
+          </a:p>
+        </p:txBody>
+      </p:sp>
+      <p:sp>
+        <p:nvSpPr>
+          <p:cNvPr id="80" name="Color Fill">
+            <a:extLst>
+              <a:ext uri="{FF2B5EF4-FFF2-40B4-BE49-F238E27FC236}">
+                <a16:creationId xmlns:a16="http://schemas.microsoft.com/office/drawing/2014/main" id="{8BECD55C-E611-4BCD-B45E-BF01D6234816}"/>
+              </a:ext>
+              <a:ext uri="{C183D7F6-B498-43B3-948B-1728B52AA6E4}">
+                <adec:decorative xmlns:adec="http://schemas.microsoft.com/office/drawing/2017/decorative" val="1"/>
+              </a:ext>
+            </a:extLst>
+          </p:cNvPr>
+          <p:cNvSpPr>
+            <a:spLocks noGrp="1" noRot="1" noChangeAspect="1" noMove="1" noResize="1" noEditPoints="1" noAdjustHandles="1" noChangeArrowheads="1" noChangeShapeType="1" noTextEdit="1"/>
+          </p:cNvSpPr>
+          <p:nvPr>
+            <p:extLst>
+              <p:ext uri="{386F3935-93C4-4BCD-93E2-E3B085C9AB24}">
+                <p16:designElem xmlns:p16="http://schemas.microsoft.com/office/powerpoint/2015/main" val="1"/>
+              </p:ext>
+            </p:extLst>
+          </p:nvPr>
+        </p:nvSpPr>
+        <p:spPr>
+          <a:xfrm>
+            <a:off x="3048" y="0"/>
+            <a:ext cx="12188952" cy="6858000"/>
+          </a:xfrm>
+          <a:prstGeom prst="rect">
+            <a:avLst/>
+          </a:prstGeom>
+          <a:solidFill>
+            <a:schemeClr val="bg2">
+              <a:lumMod val="75000"/>
+              <a:lumOff val="25000"/>
+              <a:alpha val="40000"/>
+            </a:schemeClr>
+          </a:solidFill>
+          <a:ln w="9525" cap="flat">
+            <a:noFill/>
+            <a:prstDash val="solid"/>
+            <a:miter/>
+          </a:ln>
+        </p:spPr>
+        <p:txBody>
+          <a:bodyPr rtlCol="0" anchor="ctr"/>
+          <a:lstStyle/>
+          <a:p>
+            <a:endParaRPr lang="en-US" dirty="0">
+              <a:solidFill>
+                <a:schemeClr val="bg2">
+                  <a:lumMod val="75000"/>
+                  <a:lumOff val="25000"/>
+                </a:schemeClr>
+              </a:solidFill>
+            </a:endParaRPr>
+          </a:p>
+        </p:txBody>
+      </p:sp>
+      <p:sp>
+        <p:nvSpPr>
+          <p:cNvPr id="82" name="Graphic 9">
+            <a:extLst>
+              <a:ext uri="{FF2B5EF4-FFF2-40B4-BE49-F238E27FC236}">
+                <a16:creationId xmlns:a16="http://schemas.microsoft.com/office/drawing/2014/main" id="{1B8F0E52-7B96-44E2-BC48-F2D2BAC4611F}"/>
+              </a:ext>
+              <a:ext uri="{C183D7F6-B498-43B3-948B-1728B52AA6E4}">
+                <adec:decorative xmlns:adec="http://schemas.microsoft.com/office/drawing/2017/decorative" val="1"/>
+              </a:ext>
+            </a:extLst>
+          </p:cNvPr>
+          <p:cNvSpPr>
+            <a:spLocks noGrp="1" noRot="1" noChangeAspect="1" noMove="1" noResize="1" noEditPoints="1" noAdjustHandles="1" noChangeArrowheads="1" noChangeShapeType="1" noTextEdit="1"/>
+          </p:cNvSpPr>
+          <p:nvPr>
+            <p:extLst>
+              <p:ext uri="{386F3935-93C4-4BCD-93E2-E3B085C9AB24}">
+                <p16:designElem xmlns:p16="http://schemas.microsoft.com/office/powerpoint/2015/main" val="1"/>
+              </p:ext>
+            </p:extLst>
+          </p:nvPr>
+        </p:nvSpPr>
+        <p:spPr>
+          <a:xfrm>
+            <a:off x="5292379" y="16681"/>
+            <a:ext cx="6905281" cy="6827374"/>
+          </a:xfrm>
+          <a:custGeom>
+            <a:avLst/>
+            <a:gdLst>
+              <a:gd name="connsiteX0" fmla="*/ 6861546 w 6861545"/>
+              <a:gd name="connsiteY0" fmla="*/ 6861546 h 6861545"/>
+              <a:gd name="connsiteX1" fmla="*/ 3435812 w 6861545"/>
+              <a:gd name="connsiteY1" fmla="*/ 6861546 h 6861545"/>
+              <a:gd name="connsiteX2" fmla="*/ 0 w 6861545"/>
+              <a:gd name="connsiteY2" fmla="*/ 3425734 h 6861545"/>
+              <a:gd name="connsiteX3" fmla="*/ 0 w 6861545"/>
+              <a:gd name="connsiteY3" fmla="*/ 0 h 6861545"/>
+              <a:gd name="connsiteX4" fmla="*/ 3425734 w 6861545"/>
+              <a:gd name="connsiteY4" fmla="*/ 0 h 6861545"/>
+              <a:gd name="connsiteX5" fmla="*/ 6861546 w 6861545"/>
+              <a:gd name="connsiteY5" fmla="*/ 3435812 h 6861545"/>
+              <a:gd name="connsiteX6" fmla="*/ 6861546 w 6861545"/>
+              <a:gd name="connsiteY6" fmla="*/ 6861546 h 6861545"/>
+            </a:gdLst>
+            <a:ahLst/>
+            <a:cxnLst>
+              <a:cxn ang="0">
+                <a:pos x="connsiteX0" y="connsiteY0"/>
+              </a:cxn>
+              <a:cxn ang="0">
+                <a:pos x="connsiteX1" y="connsiteY1"/>
+              </a:cxn>
+              <a:cxn ang="0">
+                <a:pos x="connsiteX2" y="connsiteY2"/>
+              </a:cxn>
+              <a:cxn ang="0">
+                <a:pos x="connsiteX3" y="connsiteY3"/>
+              </a:cxn>
+              <a:cxn ang="0">
+                <a:pos x="connsiteX4" y="connsiteY4"/>
+              </a:cxn>
+              <a:cxn ang="0">
+                <a:pos x="connsiteX5" y="connsiteY5"/>
+              </a:cxn>
+              <a:cxn ang="0">
+                <a:pos x="connsiteX6" y="connsiteY6"/>
+              </a:cxn>
+            </a:cxnLst>
+            <a:rect l="l" t="t" r="r" b="b"/>
+            <a:pathLst>
+              <a:path w="6861545" h="6861545">
+                <a:moveTo>
+                  <a:pt x="6861546" y="6861546"/>
+                </a:moveTo>
+                <a:lnTo>
+                  <a:pt x="3435812" y="6861546"/>
+                </a:lnTo>
+                <a:cubicBezTo>
+                  <a:pt x="1538245" y="6861546"/>
+                  <a:pt x="0" y="5323301"/>
+                  <a:pt x="0" y="3425734"/>
+                </a:cubicBezTo>
+                <a:lnTo>
+                  <a:pt x="0" y="0"/>
+                </a:lnTo>
+                <a:lnTo>
+                  <a:pt x="3425734" y="0"/>
+                </a:lnTo>
+                <a:cubicBezTo>
+                  <a:pt x="5323301" y="0"/>
+                  <a:pt x="6861546" y="1538245"/>
+                  <a:pt x="6861546" y="3435812"/>
+                </a:cubicBezTo>
+                <a:lnTo>
+                  <a:pt x="6861546" y="6861546"/>
+                </a:lnTo>
+                <a:close/>
+              </a:path>
+            </a:pathLst>
+          </a:custGeom>
+          <a:solidFill>
+            <a:srgbClr val="FFFFFF"/>
+          </a:solidFill>
+          <a:ln w="38100" cap="flat">
+            <a:solidFill>
+              <a:srgbClr val="F7F7F7"/>
+            </a:solidFill>
+            <a:prstDash val="solid"/>
+            <a:miter/>
+          </a:ln>
+        </p:spPr>
+        <p:txBody>
+          <a:bodyPr rtlCol="0" anchor="ctr"/>
+          <a:lstStyle/>
+          <a:p>
+            <a:endParaRPr lang="en-US" dirty="0"/>
+          </a:p>
+        </p:txBody>
+      </p:sp>
+      <p:sp>
+        <p:nvSpPr>
+          <p:cNvPr id="84" name="Texture">
+            <a:extLst>
+              <a:ext uri="{FF2B5EF4-FFF2-40B4-BE49-F238E27FC236}">
+                <a16:creationId xmlns:a16="http://schemas.microsoft.com/office/drawing/2014/main" id="{0D29D77D-2D4E-4868-960B-BEDA724F5CE2}"/>
+              </a:ext>
+              <a:ext uri="{C183D7F6-B498-43B3-948B-1728B52AA6E4}">
+                <adec:decorative xmlns:adec="http://schemas.microsoft.com/office/drawing/2017/decorative" val="1"/>
+              </a:ext>
+            </a:extLst>
+          </p:cNvPr>
+          <p:cNvSpPr>
+            <a:spLocks noGrp="1" noRot="1" noChangeAspect="1" noMove="1" noResize="1" noEditPoints="1" noAdjustHandles="1" noChangeArrowheads="1" noChangeShapeType="1" noTextEdit="1"/>
+          </p:cNvSpPr>
+          <p:nvPr>
+            <p:extLst>
+              <p:ext uri="{386F3935-93C4-4BCD-93E2-E3B085C9AB24}">
+                <p16:designElem xmlns:p16="http://schemas.microsoft.com/office/powerpoint/2015/main" val="1"/>
+              </p:ext>
+            </p:extLst>
+          </p:nvPr>
+        </p:nvSpPr>
+        <p:spPr>
+          <a:xfrm>
+            <a:off x="3048" y="0"/>
+            <a:ext cx="12188952" cy="6858000"/>
+          </a:xfrm>
+          <a:prstGeom prst="rect">
+            <a:avLst/>
+          </a:prstGeom>
+          <a:blipFill dpi="0" rotWithShape="1">
+            <a:blip r:embed="rId2">
+              <a:alphaModFix amt="6000"/>
+            </a:blip>
+            <a:srcRect/>
+            <a:tile tx="0" ty="0" sx="100000" sy="100000" flip="none" algn="tl"/>
+          </a:blipFill>
+          <a:ln w="9525" cap="flat">
+            <a:noFill/>
+            <a:prstDash val="solid"/>
+            <a:miter/>
+          </a:ln>
+        </p:spPr>
+        <p:txBody>
+          <a:bodyPr rtlCol="0" anchor="ctr"/>
+          <a:lstStyle/>
+          <a:p>
+            <a:endParaRPr lang="en-US" dirty="0"/>
+          </a:p>
+        </p:txBody>
+      </p:sp>
       <p:sp>
         <p:nvSpPr>
           <p:cNvPr id="2" name="Title 1">
@@ -11048,13 +12106,20 @@
             <p:ph type="title"/>
           </p:nvPr>
         </p:nvSpPr>
-        <p:spPr/>
+        <p:spPr>
+          <a:xfrm>
+            <a:off x="457200" y="676656"/>
+            <a:ext cx="4563482" cy="3063240"/>
+          </a:xfrm>
+        </p:spPr>
         <p:txBody>
-          <a:bodyPr/>
+          <a:bodyPr vert="horz" lIns="91440" tIns="45720" rIns="91440" bIns="45720" rtlCol="0" anchor="b">
+            <a:normAutofit/>
+          </a:bodyPr>
           <a:lstStyle/>
           <a:p>
             <a:r>
-              <a:rPr lang="en-US" dirty="0"/>
+              <a:rPr lang="en-US" sz="5400"/>
               <a:t>Technical Details</a:t>
             </a:r>
           </a:p>
@@ -11062,10 +12127,10 @@
       </p:sp>
       <p:pic>
         <p:nvPicPr>
-          <p:cNvPr id="5" name="Content Placeholder 4" descr="A diagram of a computer&#10;&#10;Description automatically generated">
+          <p:cNvPr id="11" name="Content Placeholder 10" descr="A screenshot of a computer&#10;&#10;Description automatically generated">
             <a:extLst>
               <a:ext uri="{FF2B5EF4-FFF2-40B4-BE49-F238E27FC236}">
-                <a16:creationId xmlns:a16="http://schemas.microsoft.com/office/drawing/2014/main" id="{B6D61DE7-314F-8DEA-61BE-DA6664FA8A2A}"/>
+                <a16:creationId xmlns:a16="http://schemas.microsoft.com/office/drawing/2014/main" id="{50989FE8-71AB-4B61-8E17-A89AE9F2F738}"/>
               </a:ext>
             </a:extLst>
           </p:cNvPr>
@@ -11077,21 +12142,15 @@
           </p:nvPr>
         </p:nvPicPr>
         <p:blipFill>
-          <a:blip r:embed="rId2">
-            <a:extLst>
-              <a:ext uri="{28A0092B-C50C-407E-A947-70E740481C1C}">
-                <a14:useLocalDpi xmlns:a14="http://schemas.microsoft.com/office/drawing/2010/main" val="0"/>
-              </a:ext>
-            </a:extLst>
-          </a:blip>
+          <a:blip r:embed="rId3"/>
           <a:stretch>
             <a:fillRect/>
           </a:stretch>
         </p:blipFill>
         <p:spPr>
           <a:xfrm>
-            <a:off x="4951142" y="194329"/>
-            <a:ext cx="5544287" cy="6442148"/>
+            <a:off x="5622760" y="170878"/>
+            <a:ext cx="5280142" cy="6514743"/>
           </a:xfrm>
         </p:spPr>
       </p:pic>

</xml_diff>